<commit_message>
Added sentiment analysis on 2nd level pretrained bert with instructions
</commit_message>
<xml_diff>
--- a/TopicPresentation.pptx
+++ b/TopicPresentation.pptx
@@ -207,7 +207,7 @@
           <a:p>
             <a:fld id="{74C865EA-CDE8-394C-9B9C-9350BDCC271B}" type="datetimeFigureOut">
               <a:rPr lang="en-US" smtClean="0"/>
-              <a:t>5/10/21</a:t>
+              <a:t>5/27/21</a:t>
             </a:fld>
             <a:endParaRPr lang="en-US"/>
           </a:p>
@@ -734,7 +734,7 @@
           <a:p>
             <a:fld id="{5C8644B3-152F-0B4F-8D89-267633317544}" type="datetimeFigureOut">
               <a:rPr lang="en-US" smtClean="0"/>
-              <a:t>5/10/21</a:t>
+              <a:t>5/27/21</a:t>
             </a:fld>
             <a:endParaRPr lang="en-US"/>
           </a:p>
@@ -945,7 +945,7 @@
           <a:p>
             <a:fld id="{5C8644B3-152F-0B4F-8D89-267633317544}" type="datetimeFigureOut">
               <a:rPr lang="en-US" smtClean="0"/>
-              <a:t>5/10/21</a:t>
+              <a:t>5/27/21</a:t>
             </a:fld>
             <a:endParaRPr lang="en-US"/>
           </a:p>
@@ -1160,7 +1160,7 @@
           <a:p>
             <a:fld id="{5C8644B3-152F-0B4F-8D89-267633317544}" type="datetimeFigureOut">
               <a:rPr lang="en-US" smtClean="0"/>
-              <a:t>5/10/21</a:t>
+              <a:t>5/27/21</a:t>
             </a:fld>
             <a:endParaRPr lang="en-US"/>
           </a:p>
@@ -1361,7 +1361,7 @@
           <a:p>
             <a:fld id="{5C8644B3-152F-0B4F-8D89-267633317544}" type="datetimeFigureOut">
               <a:rPr lang="en-US" smtClean="0"/>
-              <a:t>5/10/21</a:t>
+              <a:t>5/27/21</a:t>
             </a:fld>
             <a:endParaRPr lang="en-US"/>
           </a:p>
@@ -1640,7 +1640,7 @@
           <a:p>
             <a:fld id="{5C8644B3-152F-0B4F-8D89-267633317544}" type="datetimeFigureOut">
               <a:rPr lang="en-US" smtClean="0"/>
-              <a:t>5/10/21</a:t>
+              <a:t>5/27/21</a:t>
             </a:fld>
             <a:endParaRPr lang="en-US"/>
           </a:p>
@@ -1908,7 +1908,7 @@
           <a:p>
             <a:fld id="{5C8644B3-152F-0B4F-8D89-267633317544}" type="datetimeFigureOut">
               <a:rPr lang="en-US" smtClean="0"/>
-              <a:t>5/10/21</a:t>
+              <a:t>5/27/21</a:t>
             </a:fld>
             <a:endParaRPr lang="en-US"/>
           </a:p>
@@ -2324,7 +2324,7 @@
           <a:p>
             <a:fld id="{5C8644B3-152F-0B4F-8D89-267633317544}" type="datetimeFigureOut">
               <a:rPr lang="en-US" smtClean="0"/>
-              <a:t>5/10/21</a:t>
+              <a:t>5/27/21</a:t>
             </a:fld>
             <a:endParaRPr lang="en-US"/>
           </a:p>
@@ -2473,7 +2473,7 @@
           <a:p>
             <a:fld id="{5C8644B3-152F-0B4F-8D89-267633317544}" type="datetimeFigureOut">
               <a:rPr lang="en-US" smtClean="0"/>
-              <a:t>5/10/21</a:t>
+              <a:t>5/27/21</a:t>
             </a:fld>
             <a:endParaRPr lang="en-US"/>
           </a:p>
@@ -2599,7 +2599,7 @@
           <a:p>
             <a:fld id="{5C8644B3-152F-0B4F-8D89-267633317544}" type="datetimeFigureOut">
               <a:rPr lang="en-US" smtClean="0"/>
-              <a:t>5/10/21</a:t>
+              <a:t>5/27/21</a:t>
             </a:fld>
             <a:endParaRPr lang="en-US"/>
           </a:p>
@@ -2850,7 +2850,7 @@
           <a:p>
             <a:fld id="{5C8644B3-152F-0B4F-8D89-267633317544}" type="datetimeFigureOut">
               <a:rPr lang="en-US" smtClean="0"/>
-              <a:t>5/10/21</a:t>
+              <a:t>5/27/21</a:t>
             </a:fld>
             <a:endParaRPr lang="en-US"/>
           </a:p>
@@ -3295,7 +3295,7 @@
           <a:p>
             <a:fld id="{5C8644B3-152F-0B4F-8D89-267633317544}" type="datetimeFigureOut">
               <a:rPr lang="en-US" smtClean="0"/>
-              <a:t>5/10/21</a:t>
+              <a:t>5/27/21</a:t>
             </a:fld>
             <a:endParaRPr lang="en-US"/>
           </a:p>
@@ -3622,7 +3622,7 @@
           <a:p>
             <a:fld id="{5C8644B3-152F-0B4F-8D89-267633317544}" type="datetimeFigureOut">
               <a:rPr lang="en-US" smtClean="0"/>
-              <a:t>5/10/21</a:t>
+              <a:t>5/27/21</a:t>
             </a:fld>
             <a:endParaRPr lang="en-US"/>
           </a:p>

</xml_diff>